<commit_message>
Public Domain note added
</commit_message>
<xml_diff>
--- a/research/nfc-based-qr-replacement.pptx
+++ b/research/nfc-based-qr-replacement.pptx
@@ -15561,14 +15561,7 @@
                 <a:latin typeface="Arial" panose="020B0604020202020204" pitchFamily="34" charset="0"/>
                 <a:cs typeface="Arial" panose="020B0604020202020204" pitchFamily="34" charset="0"/>
               </a:rPr>
-              <a:t> Login Page State </a:t>
-            </a:r>
-            <a:r>
-              <a:rPr lang="en-US" sz="1200" dirty="0" smtClean="0">
-                <a:latin typeface="Arial" panose="020B0604020202020204" pitchFamily="34" charset="0"/>
-                <a:cs typeface="Arial" panose="020B0604020202020204" pitchFamily="34" charset="0"/>
-              </a:rPr>
-              <a:t>Service</a:t>
+              <a:t> Login Page State Service</a:t>
             </a:r>
             <a:endParaRPr lang="en-US" sz="1200" dirty="0">
               <a:latin typeface="Arial" panose="020B0604020202020204" pitchFamily="34" charset="0"/>
@@ -15798,14 +15791,7 @@
                 <a:latin typeface="Arial" panose="020B0604020202020204" pitchFamily="34" charset="0"/>
                 <a:cs typeface="Arial" panose="020B0604020202020204" pitchFamily="34" charset="0"/>
               </a:rPr>
-              <a:t> Login Page State </a:t>
-            </a:r>
-            <a:r>
-              <a:rPr lang="en-US" sz="1200" dirty="0" smtClean="0">
-                <a:latin typeface="Arial" panose="020B0604020202020204" pitchFamily="34" charset="0"/>
-                <a:cs typeface="Arial" panose="020B0604020202020204" pitchFamily="34" charset="0"/>
-              </a:rPr>
-              <a:t>Change</a:t>
+              <a:t> Login Page State Change</a:t>
             </a:r>
             <a:endParaRPr lang="en-US" sz="1200" dirty="0">
               <a:latin typeface="Arial" panose="020B0604020202020204" pitchFamily="34" charset="0"/>
@@ -16205,14 +16191,7 @@
                 <a:latin typeface="Arial" panose="020B0604020202020204" pitchFamily="34" charset="0"/>
                 <a:cs typeface="Arial" panose="020B0604020202020204" pitchFamily="34" charset="0"/>
               </a:rPr>
-              <a:t>Login </a:t>
-            </a:r>
-            <a:r>
-              <a:rPr lang="en-US" sz="1000" dirty="0" smtClean="0">
-                <a:latin typeface="Arial" panose="020B0604020202020204" pitchFamily="34" charset="0"/>
-                <a:cs typeface="Arial" panose="020B0604020202020204" pitchFamily="34" charset="0"/>
-              </a:rPr>
-              <a:t>Cache *</a:t>
+              <a:t>Login Cache *</a:t>
             </a:r>
             <a:endParaRPr lang="en-US" sz="1000" dirty="0">
               <a:latin typeface="Arial" panose="020B0604020202020204" pitchFamily="34" charset="0"/>
@@ -16910,14 +16889,7 @@
                 <a:latin typeface="Arial" panose="020B0604020202020204" pitchFamily="34" charset="0"/>
                 <a:cs typeface="Arial" panose="020B0604020202020204" pitchFamily="34" charset="0"/>
               </a:rPr>
-              <a:t>Login </a:t>
-            </a:r>
-            <a:r>
-              <a:rPr lang="en-US" sz="1000" dirty="0" smtClean="0">
-                <a:latin typeface="Arial" panose="020B0604020202020204" pitchFamily="34" charset="0"/>
-                <a:cs typeface="Arial" panose="020B0604020202020204" pitchFamily="34" charset="0"/>
-              </a:rPr>
-              <a:t>Cache *</a:t>
+              <a:t>Login Cache *</a:t>
             </a:r>
             <a:endParaRPr lang="en-US" sz="1000" dirty="0">
               <a:latin typeface="Arial" panose="020B0604020202020204" pitchFamily="34" charset="0"/>
@@ -18570,14 +18542,7 @@
                 <a:latin typeface="Arial" panose="020B0604020202020204" pitchFamily="34" charset="0"/>
                 <a:cs typeface="Arial" panose="020B0604020202020204" pitchFamily="34" charset="0"/>
               </a:rPr>
-              <a:t>with </a:t>
-            </a:r>
-            <a:r>
-              <a:rPr lang="en-US" sz="1200" dirty="0" smtClean="0">
-                <a:latin typeface="Arial" panose="020B0604020202020204" pitchFamily="34" charset="0"/>
-                <a:cs typeface="Arial" panose="020B0604020202020204" pitchFamily="34" charset="0"/>
-              </a:rPr>
-              <a:t>Web Application</a:t>
+              <a:t>with Web Application</a:t>
             </a:r>
             <a:endParaRPr lang="en-US" sz="1200" dirty="0">
               <a:latin typeface="Arial" panose="020B0604020202020204" pitchFamily="34" charset="0"/>
@@ -19602,14 +19567,7 @@
                 <a:latin typeface="Arial" panose="020B0604020202020204" pitchFamily="34" charset="0"/>
                 <a:cs typeface="Arial" panose="020B0604020202020204" pitchFamily="34" charset="0"/>
               </a:rPr>
-              <a:t> </a:t>
-            </a:r>
-            <a:r>
-              <a:rPr lang="en-US" sz="1200" dirty="0" smtClean="0">
-                <a:latin typeface="Arial" panose="020B0604020202020204" pitchFamily="34" charset="0"/>
-                <a:cs typeface="Arial" panose="020B0604020202020204" pitchFamily="34" charset="0"/>
-              </a:rPr>
-              <a:t>Write Data</a:t>
+              <a:t> Write Data</a:t>
             </a:r>
             <a:endParaRPr lang="en-US" sz="1200" dirty="0">
               <a:latin typeface="Arial" panose="020B0604020202020204" pitchFamily="34" charset="0"/>
@@ -19645,21 +19603,7 @@
                 <a:latin typeface="Arial" panose="020B0604020202020204" pitchFamily="34" charset="0"/>
                 <a:cs typeface="Arial" panose="020B0604020202020204" pitchFamily="34" charset="0"/>
               </a:rPr>
-              <a:t> </a:t>
-            </a:r>
-            <a:r>
-              <a:rPr lang="en-US" sz="1200" dirty="0" smtClean="0">
-                <a:latin typeface="Arial" panose="020B0604020202020204" pitchFamily="34" charset="0"/>
-                <a:cs typeface="Arial" panose="020B0604020202020204" pitchFamily="34" charset="0"/>
-              </a:rPr>
-              <a:t>Read</a:t>
-            </a:r>
-            <a:r>
-              <a:rPr lang="en-US" sz="1200" dirty="0" smtClean="0">
-                <a:latin typeface="Arial" panose="020B0604020202020204" pitchFamily="34" charset="0"/>
-                <a:cs typeface="Arial" panose="020B0604020202020204" pitchFamily="34" charset="0"/>
-              </a:rPr>
-              <a:t> Data</a:t>
+              <a:t> Read Data</a:t>
             </a:r>
             <a:endParaRPr lang="en-US" sz="1200" dirty="0">
               <a:latin typeface="Arial" panose="020B0604020202020204" pitchFamily="34" charset="0"/>
@@ -19704,14 +19648,7 @@
                 <a:latin typeface="Arial" panose="020B0604020202020204" pitchFamily="34" charset="0"/>
                 <a:cs typeface="Arial" panose="020B0604020202020204" pitchFamily="34" charset="0"/>
               </a:rPr>
-              <a:t>Wi-Fi, </a:t>
-            </a:r>
-            <a:r>
-              <a:rPr lang="en-US" sz="1000" dirty="0" smtClean="0">
-                <a:latin typeface="Arial" panose="020B0604020202020204" pitchFamily="34" charset="0"/>
-                <a:cs typeface="Arial" panose="020B0604020202020204" pitchFamily="34" charset="0"/>
-              </a:rPr>
-              <a:t>Bluetooth </a:t>
+              <a:t>Wi-Fi, Bluetooth </a:t>
             </a:r>
           </a:p>
           <a:p>
@@ -19841,21 +19778,7 @@
                 <a:latin typeface="Arial" panose="020B0604020202020204" pitchFamily="34" charset="0"/>
                 <a:cs typeface="Arial" panose="020B0604020202020204" pitchFamily="34" charset="0"/>
               </a:rPr>
-              <a:t>* E</a:t>
-            </a:r>
-            <a:r>
-              <a:rPr lang="en-US" sz="1000" dirty="0" smtClean="0">
-                <a:latin typeface="Arial" panose="020B0604020202020204" pitchFamily="34" charset="0"/>
-                <a:cs typeface="Arial" panose="020B0604020202020204" pitchFamily="34" charset="0"/>
-              </a:rPr>
-              <a:t>ntry</a:t>
-            </a:r>
-            <a:r>
-              <a:rPr lang="en-US" sz="1000" dirty="0" smtClean="0">
-                <a:latin typeface="Arial" panose="020B0604020202020204" pitchFamily="34" charset="0"/>
-                <a:cs typeface="Arial" panose="020B0604020202020204" pitchFamily="34" charset="0"/>
-              </a:rPr>
-              <a:t> is removed either</a:t>
+              <a:t>* Entry is removed either</a:t>
             </a:r>
             <a:br>
               <a:rPr lang="en-US" sz="1000" dirty="0" smtClean="0">
@@ -20094,6 +20017,118 @@
               <a:t>User Private Key in TEE or SE</a:t>
             </a:r>
             <a:endParaRPr lang="en-US" sz="1000" dirty="0">
+              <a:latin typeface="Arial" panose="020B0604020202020204" pitchFamily="34" charset="0"/>
+              <a:cs typeface="Arial" panose="020B0604020202020204" pitchFamily="34" charset="0"/>
+            </a:endParaRPr>
+          </a:p>
+        </p:txBody>
+      </p:sp>
+      <p:sp>
+        <p:nvSpPr>
+          <p:cNvPr id="2" name="Rounded Rectangle 1"/>
+          <p:cNvSpPr/>
+          <p:nvPr/>
+        </p:nvSpPr>
+        <p:spPr>
+          <a:xfrm>
+            <a:off x="10620821" y="323493"/>
+            <a:ext cx="1309035" cy="612934"/>
+          </a:xfrm>
+          <a:prstGeom prst="roundRect">
+            <a:avLst/>
+          </a:prstGeom>
+          <a:solidFill>
+            <a:srgbClr val="FDFAC7"/>
+          </a:solidFill>
+          <a:ln w="12700">
+            <a:solidFill>
+              <a:schemeClr val="bg1">
+                <a:lumMod val="65000"/>
+              </a:schemeClr>
+            </a:solidFill>
+          </a:ln>
+          <a:effectLst>
+            <a:outerShdw blurRad="50800" dist="38100" dir="2700000" algn="tl" rotWithShape="0">
+              <a:prstClr val="black">
+                <a:alpha val="40000"/>
+              </a:prstClr>
+            </a:outerShdw>
+          </a:effectLst>
+        </p:spPr>
+        <p:style>
+          <a:lnRef idx="2">
+            <a:schemeClr val="accent1">
+              <a:shade val="50000"/>
+            </a:schemeClr>
+          </a:lnRef>
+          <a:fillRef idx="1">
+            <a:schemeClr val="accent1"/>
+          </a:fillRef>
+          <a:effectRef idx="0">
+            <a:schemeClr val="accent1"/>
+          </a:effectRef>
+          <a:fontRef idx="minor">
+            <a:schemeClr val="lt1"/>
+          </a:fontRef>
+        </p:style>
+        <p:txBody>
+          <a:bodyPr wrap="none" rtlCol="0" anchor="ctr">
+            <a:spAutoFit/>
+          </a:bodyPr>
+          <a:lstStyle/>
+          <a:p>
+            <a:r>
+              <a:rPr lang="en-US" sz="1000" dirty="0" smtClean="0">
+                <a:solidFill>
+                  <a:schemeClr val="tx1"/>
+                </a:solidFill>
+                <a:latin typeface="Arial" panose="020B0604020202020204" pitchFamily="34" charset="0"/>
+                <a:cs typeface="Arial" panose="020B0604020202020204" pitchFamily="34" charset="0"/>
+              </a:rPr>
+              <a:t>This invention is</a:t>
+            </a:r>
+            <a:br>
+              <a:rPr lang="en-US" sz="1000" dirty="0" smtClean="0">
+                <a:solidFill>
+                  <a:schemeClr val="tx1"/>
+                </a:solidFill>
+                <a:latin typeface="Arial" panose="020B0604020202020204" pitchFamily="34" charset="0"/>
+                <a:cs typeface="Arial" panose="020B0604020202020204" pitchFamily="34" charset="0"/>
+              </a:rPr>
+            </a:br>
+            <a:r>
+              <a:rPr lang="en-US" sz="1000" dirty="0" smtClean="0">
+                <a:solidFill>
+                  <a:schemeClr val="tx1"/>
+                </a:solidFill>
+                <a:latin typeface="Arial" panose="020B0604020202020204" pitchFamily="34" charset="0"/>
+                <a:cs typeface="Arial" panose="020B0604020202020204" pitchFamily="34" charset="0"/>
+              </a:rPr>
+              <a:t>herby placed in the</a:t>
+            </a:r>
+            <a:br>
+              <a:rPr lang="en-US" sz="1000" dirty="0" smtClean="0">
+                <a:solidFill>
+                  <a:schemeClr val="tx1"/>
+                </a:solidFill>
+                <a:latin typeface="Arial" panose="020B0604020202020204" pitchFamily="34" charset="0"/>
+                <a:cs typeface="Arial" panose="020B0604020202020204" pitchFamily="34" charset="0"/>
+              </a:rPr>
+            </a:br>
+            <a:r>
+              <a:rPr lang="en-US" sz="1000" i="1" dirty="0" smtClean="0">
+                <a:solidFill>
+                  <a:schemeClr val="tx1"/>
+                </a:solidFill>
+                <a:latin typeface="Arial" panose="020B0604020202020204" pitchFamily="34" charset="0"/>
+                <a:cs typeface="Arial" panose="020B0604020202020204" pitchFamily="34" charset="0"/>
+              </a:rPr>
+              <a:t>Public Domain</a:t>
+            </a:r>
+            <a:endParaRPr lang="en-US" sz="1000" i="1" dirty="0">
+              <a:solidFill>
+                <a:schemeClr val="tx1"/>
+              </a:solidFill>
               <a:latin typeface="Arial" panose="020B0604020202020204" pitchFamily="34" charset="0"/>
               <a:cs typeface="Arial" panose="020B0604020202020204" pitchFamily="34" charset="0"/>
             </a:endParaRPr>

</xml_diff>